<commit_message>
Added the class diagram
</commit_message>
<xml_diff>
--- a/TODO_Management_System.pptx
+++ b/TODO_Management_System.pptx
@@ -14,10 +14,6 @@
     <p:sldId id="264" r:id="rId8"/>
     <p:sldId id="263" r:id="rId9"/>
     <p:sldId id="265" r:id="rId10"/>
-    <p:sldId id="266" r:id="rId11"/>
-    <p:sldId id="267" r:id="rId12"/>
-    <p:sldId id="268" r:id="rId13"/>
-    <p:sldId id="269" r:id="rId14"/>
   </p:sldIdLst>
   <p:sldSz cx="9144000" cy="6858000" type="screen4x3"/>
   <p:notesSz cx="6858000" cy="9144000"/>
@@ -300,8 +296,7 @@
           <a:p>
             <a:fld id="{9AA4BBD5-4AE7-4597-9DFA-BCF0A279A9D6}" type="datetimeFigureOut">
               <a:rPr lang="en-US" smtClean="0"/>
-              <a:pPr/>
-              <a:t>6/20/2015</a:t>
+              <a:t>6/17/2015</a:t>
             </a:fld>
             <a:endParaRPr lang="en-IN"/>
           </a:p>
@@ -343,7 +338,6 @@
           <a:p>
             <a:fld id="{6B059D28-2F4C-46CD-BCC9-4E95240E3204}" type="slidenum">
               <a:rPr lang="en-IN" smtClean="0"/>
-              <a:pPr/>
               <a:t>‹#›</a:t>
             </a:fld>
             <a:endParaRPr lang="en-IN"/>
@@ -467,8 +461,7 @@
           <a:p>
             <a:fld id="{9AA4BBD5-4AE7-4597-9DFA-BCF0A279A9D6}" type="datetimeFigureOut">
               <a:rPr lang="en-US" smtClean="0"/>
-              <a:pPr/>
-              <a:t>6/20/2015</a:t>
+              <a:t>6/17/2015</a:t>
             </a:fld>
             <a:endParaRPr lang="en-IN"/>
           </a:p>
@@ -510,7 +503,6 @@
           <a:p>
             <a:fld id="{6B059D28-2F4C-46CD-BCC9-4E95240E3204}" type="slidenum">
               <a:rPr lang="en-IN" smtClean="0"/>
-              <a:pPr/>
               <a:t>‹#›</a:t>
             </a:fld>
             <a:endParaRPr lang="en-IN"/>
@@ -644,8 +636,7 @@
           <a:p>
             <a:fld id="{9AA4BBD5-4AE7-4597-9DFA-BCF0A279A9D6}" type="datetimeFigureOut">
               <a:rPr lang="en-US" smtClean="0"/>
-              <a:pPr/>
-              <a:t>6/20/2015</a:t>
+              <a:t>6/17/2015</a:t>
             </a:fld>
             <a:endParaRPr lang="en-IN"/>
           </a:p>
@@ -687,7 +678,6 @@
           <a:p>
             <a:fld id="{6B059D28-2F4C-46CD-BCC9-4E95240E3204}" type="slidenum">
               <a:rPr lang="en-IN" smtClean="0"/>
-              <a:pPr/>
               <a:t>‹#›</a:t>
             </a:fld>
             <a:endParaRPr lang="en-IN"/>
@@ -811,8 +801,7 @@
           <a:p>
             <a:fld id="{9AA4BBD5-4AE7-4597-9DFA-BCF0A279A9D6}" type="datetimeFigureOut">
               <a:rPr lang="en-US" smtClean="0"/>
-              <a:pPr/>
-              <a:t>6/20/2015</a:t>
+              <a:t>6/17/2015</a:t>
             </a:fld>
             <a:endParaRPr lang="en-IN"/>
           </a:p>
@@ -854,7 +843,6 @@
           <a:p>
             <a:fld id="{6B059D28-2F4C-46CD-BCC9-4E95240E3204}" type="slidenum">
               <a:rPr lang="en-IN" smtClean="0"/>
-              <a:pPr/>
               <a:t>‹#›</a:t>
             </a:fld>
             <a:endParaRPr lang="en-IN"/>
@@ -1054,8 +1042,7 @@
           <a:p>
             <a:fld id="{9AA4BBD5-4AE7-4597-9DFA-BCF0A279A9D6}" type="datetimeFigureOut">
               <a:rPr lang="en-US" smtClean="0"/>
-              <a:pPr/>
-              <a:t>6/20/2015</a:t>
+              <a:t>6/17/2015</a:t>
             </a:fld>
             <a:endParaRPr lang="en-IN"/>
           </a:p>
@@ -1097,7 +1084,6 @@
           <a:p>
             <a:fld id="{6B059D28-2F4C-46CD-BCC9-4E95240E3204}" type="slidenum">
               <a:rPr lang="en-IN" smtClean="0"/>
-              <a:pPr/>
               <a:t>‹#›</a:t>
             </a:fld>
             <a:endParaRPr lang="en-IN"/>
@@ -1339,8 +1325,7 @@
           <a:p>
             <a:fld id="{9AA4BBD5-4AE7-4597-9DFA-BCF0A279A9D6}" type="datetimeFigureOut">
               <a:rPr lang="en-US" smtClean="0"/>
-              <a:pPr/>
-              <a:t>6/20/2015</a:t>
+              <a:t>6/17/2015</a:t>
             </a:fld>
             <a:endParaRPr lang="en-IN"/>
           </a:p>
@@ -1382,7 +1367,6 @@
           <a:p>
             <a:fld id="{6B059D28-2F4C-46CD-BCC9-4E95240E3204}" type="slidenum">
               <a:rPr lang="en-IN" smtClean="0"/>
-              <a:pPr/>
               <a:t>‹#›</a:t>
             </a:fld>
             <a:endParaRPr lang="en-IN"/>
@@ -1758,8 +1742,7 @@
           <a:p>
             <a:fld id="{9AA4BBD5-4AE7-4597-9DFA-BCF0A279A9D6}" type="datetimeFigureOut">
               <a:rPr lang="en-US" smtClean="0"/>
-              <a:pPr/>
-              <a:t>6/20/2015</a:t>
+              <a:t>6/17/2015</a:t>
             </a:fld>
             <a:endParaRPr lang="en-IN"/>
           </a:p>
@@ -1801,7 +1784,6 @@
           <a:p>
             <a:fld id="{6B059D28-2F4C-46CD-BCC9-4E95240E3204}" type="slidenum">
               <a:rPr lang="en-IN" smtClean="0"/>
-              <a:pPr/>
               <a:t>‹#›</a:t>
             </a:fld>
             <a:endParaRPr lang="en-IN"/>
@@ -1873,8 +1855,7 @@
           <a:p>
             <a:fld id="{9AA4BBD5-4AE7-4597-9DFA-BCF0A279A9D6}" type="datetimeFigureOut">
               <a:rPr lang="en-US" smtClean="0"/>
-              <a:pPr/>
-              <a:t>6/20/2015</a:t>
+              <a:t>6/17/2015</a:t>
             </a:fld>
             <a:endParaRPr lang="en-IN"/>
           </a:p>
@@ -1916,7 +1897,6 @@
           <a:p>
             <a:fld id="{6B059D28-2F4C-46CD-BCC9-4E95240E3204}" type="slidenum">
               <a:rPr lang="en-IN" smtClean="0"/>
-              <a:pPr/>
               <a:t>‹#›</a:t>
             </a:fld>
             <a:endParaRPr lang="en-IN"/>
@@ -1965,8 +1945,7 @@
           <a:p>
             <a:fld id="{9AA4BBD5-4AE7-4597-9DFA-BCF0A279A9D6}" type="datetimeFigureOut">
               <a:rPr lang="en-US" smtClean="0"/>
-              <a:pPr/>
-              <a:t>6/20/2015</a:t>
+              <a:t>6/17/2015</a:t>
             </a:fld>
             <a:endParaRPr lang="en-IN"/>
           </a:p>
@@ -2008,7 +1987,6 @@
           <a:p>
             <a:fld id="{6B059D28-2F4C-46CD-BCC9-4E95240E3204}" type="slidenum">
               <a:rPr lang="en-IN" smtClean="0"/>
-              <a:pPr/>
               <a:t>‹#›</a:t>
             </a:fld>
             <a:endParaRPr lang="en-IN"/>
@@ -2239,8 +2217,7 @@
           <a:p>
             <a:fld id="{9AA4BBD5-4AE7-4597-9DFA-BCF0A279A9D6}" type="datetimeFigureOut">
               <a:rPr lang="en-US" smtClean="0"/>
-              <a:pPr/>
-              <a:t>6/20/2015</a:t>
+              <a:t>6/17/2015</a:t>
             </a:fld>
             <a:endParaRPr lang="en-IN"/>
           </a:p>
@@ -2282,7 +2259,6 @@
           <a:p>
             <a:fld id="{6B059D28-2F4C-46CD-BCC9-4E95240E3204}" type="slidenum">
               <a:rPr lang="en-IN" smtClean="0"/>
-              <a:pPr/>
               <a:t>‹#›</a:t>
             </a:fld>
             <a:endParaRPr lang="en-IN"/>
@@ -2489,8 +2465,7 @@
           <a:p>
             <a:fld id="{9AA4BBD5-4AE7-4597-9DFA-BCF0A279A9D6}" type="datetimeFigureOut">
               <a:rPr lang="en-US" smtClean="0"/>
-              <a:pPr/>
-              <a:t>6/20/2015</a:t>
+              <a:t>6/17/2015</a:t>
             </a:fld>
             <a:endParaRPr lang="en-IN"/>
           </a:p>
@@ -2532,7 +2507,6 @@
           <a:p>
             <a:fld id="{6B059D28-2F4C-46CD-BCC9-4E95240E3204}" type="slidenum">
               <a:rPr lang="en-IN" smtClean="0"/>
-              <a:pPr/>
               <a:t>‹#›</a:t>
             </a:fld>
             <a:endParaRPr lang="en-IN"/>
@@ -2699,8 +2673,7 @@
           <a:p>
             <a:fld id="{9AA4BBD5-4AE7-4597-9DFA-BCF0A279A9D6}" type="datetimeFigureOut">
               <a:rPr lang="en-US" smtClean="0"/>
-              <a:pPr/>
-              <a:t>6/20/2015</a:t>
+              <a:t>6/17/2015</a:t>
             </a:fld>
             <a:endParaRPr lang="en-IN"/>
           </a:p>
@@ -2778,7 +2751,6 @@
           <a:p>
             <a:fld id="{6B059D28-2F4C-46CD-BCC9-4E95240E3204}" type="slidenum">
               <a:rPr lang="en-IN" smtClean="0"/>
-              <a:pPr/>
               <a:t>‹#›</a:t>
             </a:fld>
             <a:endParaRPr lang="en-IN"/>
@@ -3135,439 +3107,6 @@
 </p:sld>
 </file>
 
-<file path=ppt/slides/slide10.xml><?xml version="1.0" encoding="utf-8"?>
-<p:sld xmlns:a="http://schemas.openxmlformats.org/drawingml/2006/main" xmlns:r="http://schemas.openxmlformats.org/officeDocument/2006/relationships" xmlns:p="http://schemas.openxmlformats.org/presentationml/2006/main">
-  <p:cSld>
-    <p:spTree>
-      <p:nvGrpSpPr>
-        <p:cNvPr id="1" name=""/>
-        <p:cNvGrpSpPr/>
-        <p:nvPr/>
-      </p:nvGrpSpPr>
-      <p:grpSpPr>
-        <a:xfrm>
-          <a:off x="0" y="0"/>
-          <a:ext cx="0" cy="0"/>
-          <a:chOff x="0" y="0"/>
-          <a:chExt cx="0" cy="0"/>
-        </a:xfrm>
-      </p:grpSpPr>
-      <p:sp>
-        <p:nvSpPr>
-          <p:cNvPr id="2" name="Title 1"/>
-          <p:cNvSpPr>
-            <a:spLocks noGrp="1"/>
-          </p:cNvSpPr>
-          <p:nvPr>
-            <p:ph type="title"/>
-          </p:nvPr>
-        </p:nvSpPr>
-        <p:spPr/>
-        <p:txBody>
-          <a:bodyPr/>
-          <a:lstStyle/>
-          <a:p>
-            <a:r>
-              <a:rPr lang="en-IN" dirty="0" smtClean="0"/>
-              <a:t>Steps forward -22Jun2015</a:t>
-            </a:r>
-            <a:endParaRPr lang="en-IN" dirty="0"/>
-          </a:p>
-        </p:txBody>
-      </p:sp>
-      <p:sp>
-        <p:nvSpPr>
-          <p:cNvPr id="3" name="Content Placeholder 2"/>
-          <p:cNvSpPr>
-            <a:spLocks noGrp="1"/>
-          </p:cNvSpPr>
-          <p:nvPr>
-            <p:ph idx="1"/>
-          </p:nvPr>
-        </p:nvSpPr>
-        <p:spPr/>
-        <p:txBody>
-          <a:bodyPr>
-            <a:normAutofit fontScale="77500" lnSpcReduction="20000"/>
-          </a:bodyPr>
-          <a:lstStyle/>
-          <a:p>
-            <a:r>
-              <a:rPr lang="en-IN" dirty="0" smtClean="0"/>
-              <a:t>First complete the coding for the </a:t>
-            </a:r>
-            <a:r>
-              <a:rPr lang="en-IN" dirty="0" err="1" smtClean="0"/>
-              <a:t>TODOManager</a:t>
-            </a:r>
-            <a:r>
-              <a:rPr lang="en-IN" dirty="0" smtClean="0"/>
-              <a:t> class and the Services layer and the Domain layer .</a:t>
-            </a:r>
-          </a:p>
-          <a:p>
-            <a:r>
-              <a:rPr lang="en-IN" dirty="0" smtClean="0"/>
-              <a:t>Follow the TDD approach and test these three layers code .</a:t>
-            </a:r>
-          </a:p>
-          <a:p>
-            <a:r>
-              <a:rPr lang="en-IN" dirty="0" smtClean="0"/>
-              <a:t>Use stubs for mimicking the database which can be abstracted using a simple interface and later use a Hibernate based implementation for the integration of the DAO layer with the Front end code .</a:t>
-            </a:r>
-          </a:p>
-          <a:p>
-            <a:r>
-              <a:rPr lang="en-IN" dirty="0" smtClean="0"/>
-              <a:t>Need to test the usage of the </a:t>
-            </a:r>
-            <a:r>
-              <a:rPr lang="en-IN" dirty="0" err="1" smtClean="0"/>
-              <a:t>TravisCI</a:t>
-            </a:r>
-            <a:r>
-              <a:rPr lang="en-IN" dirty="0" smtClean="0"/>
-              <a:t> with the ant scripts </a:t>
-            </a:r>
-            <a:r>
-              <a:rPr lang="en-IN" dirty="0" smtClean="0"/>
-              <a:t>as an interim approach. This needs to be later replaced with maven scripts later or vice versa .</a:t>
-            </a:r>
-          </a:p>
-          <a:p>
-            <a:r>
-              <a:rPr lang="en-IN" dirty="0" smtClean="0"/>
-              <a:t>The DAO layer includes the usage of Hibernate and the Database (</a:t>
-            </a:r>
-            <a:r>
-              <a:rPr lang="en-IN" dirty="0" err="1" smtClean="0"/>
-              <a:t>SQLite</a:t>
-            </a:r>
-            <a:r>
-              <a:rPr lang="en-IN" dirty="0" smtClean="0"/>
-              <a:t> at this point , might have to switch to </a:t>
-            </a:r>
-            <a:r>
-              <a:rPr lang="en-IN" dirty="0" err="1" smtClean="0"/>
-              <a:t>MySQL</a:t>
-            </a:r>
-            <a:r>
-              <a:rPr lang="en-IN" dirty="0" smtClean="0"/>
-              <a:t> or </a:t>
-            </a:r>
-            <a:r>
-              <a:rPr lang="en-IN" dirty="0" err="1" smtClean="0"/>
-              <a:t>PostGres</a:t>
-            </a:r>
-            <a:r>
-              <a:rPr lang="en-IN" dirty="0" smtClean="0"/>
-              <a:t> in case Hibernate does not support it .)</a:t>
-            </a:r>
-          </a:p>
-          <a:p>
-            <a:endParaRPr lang="en-IN" dirty="0" smtClean="0"/>
-          </a:p>
-          <a:p>
-            <a:endParaRPr lang="en-IN" dirty="0"/>
-          </a:p>
-        </p:txBody>
-      </p:sp>
-    </p:spTree>
-  </p:cSld>
-  <p:clrMapOvr>
-    <a:masterClrMapping/>
-  </p:clrMapOvr>
-</p:sld>
-</file>
-
-<file path=ppt/slides/slide11.xml><?xml version="1.0" encoding="utf-8"?>
-<p:sld xmlns:a="http://schemas.openxmlformats.org/drawingml/2006/main" xmlns:r="http://schemas.openxmlformats.org/officeDocument/2006/relationships" xmlns:p="http://schemas.openxmlformats.org/presentationml/2006/main">
-  <p:cSld>
-    <p:spTree>
-      <p:nvGrpSpPr>
-        <p:cNvPr id="1" name=""/>
-        <p:cNvGrpSpPr/>
-        <p:nvPr/>
-      </p:nvGrpSpPr>
-      <p:grpSpPr>
-        <a:xfrm>
-          <a:off x="0" y="0"/>
-          <a:ext cx="0" cy="0"/>
-          <a:chOff x="0" y="0"/>
-          <a:chExt cx="0" cy="0"/>
-        </a:xfrm>
-      </p:grpSpPr>
-      <p:sp>
-        <p:nvSpPr>
-          <p:cNvPr id="2" name="Title 1"/>
-          <p:cNvSpPr>
-            <a:spLocks noGrp="1"/>
-          </p:cNvSpPr>
-          <p:nvPr>
-            <p:ph type="title"/>
-          </p:nvPr>
-        </p:nvSpPr>
-        <p:spPr/>
-        <p:txBody>
-          <a:bodyPr/>
-          <a:lstStyle/>
-          <a:p>
-            <a:r>
-              <a:rPr lang="en-IN" dirty="0" smtClean="0"/>
-              <a:t>Coding – Approach , time lines</a:t>
-            </a:r>
-            <a:endParaRPr lang="en-IN" dirty="0"/>
-          </a:p>
-        </p:txBody>
-      </p:sp>
-      <p:sp>
-        <p:nvSpPr>
-          <p:cNvPr id="3" name="Content Placeholder 2"/>
-          <p:cNvSpPr>
-            <a:spLocks noGrp="1"/>
-          </p:cNvSpPr>
-          <p:nvPr>
-            <p:ph idx="1"/>
-          </p:nvPr>
-        </p:nvSpPr>
-        <p:spPr/>
-        <p:txBody>
-          <a:bodyPr>
-            <a:normAutofit fontScale="92500" lnSpcReduction="20000"/>
-          </a:bodyPr>
-          <a:lstStyle/>
-          <a:p>
-            <a:r>
-              <a:rPr lang="en-IN" dirty="0" smtClean="0"/>
-              <a:t>As we are looking at a multi tiered , layered implementation, we would need to define the contracts between each of the layers using interfaces.</a:t>
-            </a:r>
-          </a:p>
-          <a:p>
-            <a:r>
-              <a:rPr lang="en-IN" dirty="0" smtClean="0"/>
-              <a:t>Finish the code and test cases for the Manager class , Services layer and the Domain layer.</a:t>
-            </a:r>
-          </a:p>
-          <a:p>
-            <a:r>
-              <a:rPr lang="en-IN" dirty="0" smtClean="0"/>
-              <a:t>Proceed with the </a:t>
-            </a:r>
-            <a:r>
-              <a:rPr lang="en-IN" dirty="0" err="1" smtClean="0"/>
-              <a:t>TravisCI</a:t>
-            </a:r>
-            <a:r>
-              <a:rPr lang="en-IN" dirty="0" smtClean="0"/>
-              <a:t> support implementation for the automatic code build support.</a:t>
-            </a:r>
-          </a:p>
-          <a:p>
-            <a:r>
-              <a:rPr lang="en-IN" dirty="0" smtClean="0"/>
-              <a:t>Hope to do this by the end of this week  and later proceed with study on the DAO layer .</a:t>
-            </a:r>
-          </a:p>
-          <a:p>
-            <a:endParaRPr lang="en-IN" dirty="0"/>
-          </a:p>
-        </p:txBody>
-      </p:sp>
-    </p:spTree>
-  </p:cSld>
-  <p:clrMapOvr>
-    <a:masterClrMapping/>
-  </p:clrMapOvr>
-</p:sld>
-</file>
-
-<file path=ppt/slides/slide12.xml><?xml version="1.0" encoding="utf-8"?>
-<p:sld xmlns:a="http://schemas.openxmlformats.org/drawingml/2006/main" xmlns:r="http://schemas.openxmlformats.org/officeDocument/2006/relationships" xmlns:p="http://schemas.openxmlformats.org/presentationml/2006/main">
-  <p:cSld>
-    <p:spTree>
-      <p:nvGrpSpPr>
-        <p:cNvPr id="1" name=""/>
-        <p:cNvGrpSpPr/>
-        <p:nvPr/>
-      </p:nvGrpSpPr>
-      <p:grpSpPr>
-        <a:xfrm>
-          <a:off x="0" y="0"/>
-          <a:ext cx="0" cy="0"/>
-          <a:chOff x="0" y="0"/>
-          <a:chExt cx="0" cy="0"/>
-        </a:xfrm>
-      </p:grpSpPr>
-      <p:sp>
-        <p:nvSpPr>
-          <p:cNvPr id="2" name="Title 1"/>
-          <p:cNvSpPr>
-            <a:spLocks noGrp="1"/>
-          </p:cNvSpPr>
-          <p:nvPr>
-            <p:ph type="title"/>
-          </p:nvPr>
-        </p:nvSpPr>
-        <p:spPr/>
-        <p:txBody>
-          <a:bodyPr/>
-          <a:lstStyle/>
-          <a:p>
-            <a:r>
-              <a:rPr lang="en-IN" dirty="0" smtClean="0"/>
-              <a:t>Coding - DAO</a:t>
-            </a:r>
-            <a:endParaRPr lang="en-IN" dirty="0"/>
-          </a:p>
-        </p:txBody>
-      </p:sp>
-      <p:sp>
-        <p:nvSpPr>
-          <p:cNvPr id="3" name="Content Placeholder 2"/>
-          <p:cNvSpPr>
-            <a:spLocks noGrp="1"/>
-          </p:cNvSpPr>
-          <p:nvPr>
-            <p:ph idx="1"/>
-          </p:nvPr>
-        </p:nvSpPr>
-        <p:spPr/>
-        <p:txBody>
-          <a:bodyPr/>
-          <a:lstStyle/>
-          <a:p>
-            <a:r>
-              <a:rPr lang="en-IN" dirty="0" smtClean="0"/>
-              <a:t>Starting next week start the set up and coding of the DAO layer .(Hibernate tutorials)</a:t>
-            </a:r>
-          </a:p>
-          <a:p>
-            <a:r>
-              <a:rPr lang="en-IN" dirty="0" smtClean="0"/>
-              <a:t>As we have to follow TDD .. Understand about the </a:t>
-            </a:r>
-            <a:r>
-              <a:rPr lang="en-IN" dirty="0" err="1" smtClean="0"/>
-              <a:t>DBUnit</a:t>
-            </a:r>
-            <a:r>
-              <a:rPr lang="en-IN" dirty="0" smtClean="0"/>
-              <a:t> , </a:t>
-            </a:r>
-            <a:r>
-              <a:rPr lang="en-IN" dirty="0" err="1" smtClean="0"/>
-              <a:t>Mockito</a:t>
-            </a:r>
-            <a:r>
-              <a:rPr lang="en-IN" dirty="0" smtClean="0"/>
-              <a:t> and how to set up </a:t>
-            </a:r>
-            <a:r>
-              <a:rPr lang="en-IN" dirty="0" err="1" smtClean="0"/>
-              <a:t>DBScripts</a:t>
-            </a:r>
-            <a:r>
-              <a:rPr lang="en-IN" dirty="0" smtClean="0"/>
-              <a:t> for the test harnesses that we might need to create.</a:t>
-            </a:r>
-            <a:endParaRPr lang="en-IN" dirty="0"/>
-          </a:p>
-        </p:txBody>
-      </p:sp>
-    </p:spTree>
-  </p:cSld>
-  <p:clrMapOvr>
-    <a:masterClrMapping/>
-  </p:clrMapOvr>
-</p:sld>
-</file>
-
-<file path=ppt/slides/slide13.xml><?xml version="1.0" encoding="utf-8"?>
-<p:sld xmlns:a="http://schemas.openxmlformats.org/drawingml/2006/main" xmlns:r="http://schemas.openxmlformats.org/officeDocument/2006/relationships" xmlns:p="http://schemas.openxmlformats.org/presentationml/2006/main">
-  <p:cSld>
-    <p:spTree>
-      <p:nvGrpSpPr>
-        <p:cNvPr id="1" name=""/>
-        <p:cNvGrpSpPr/>
-        <p:nvPr/>
-      </p:nvGrpSpPr>
-      <p:grpSpPr>
-        <a:xfrm>
-          <a:off x="0" y="0"/>
-          <a:ext cx="0" cy="0"/>
-          <a:chOff x="0" y="0"/>
-          <a:chExt cx="0" cy="0"/>
-        </a:xfrm>
-      </p:grpSpPr>
-      <p:sp>
-        <p:nvSpPr>
-          <p:cNvPr id="2" name="Title 1"/>
-          <p:cNvSpPr>
-            <a:spLocks noGrp="1"/>
-          </p:cNvSpPr>
-          <p:nvPr>
-            <p:ph type="title"/>
-          </p:nvPr>
-        </p:nvSpPr>
-        <p:spPr/>
-        <p:txBody>
-          <a:bodyPr/>
-          <a:lstStyle/>
-          <a:p>
-            <a:r>
-              <a:rPr lang="en-IN" dirty="0" smtClean="0"/>
-              <a:t>Development Environment</a:t>
-            </a:r>
-            <a:endParaRPr lang="en-IN" dirty="0"/>
-          </a:p>
-        </p:txBody>
-      </p:sp>
-      <p:sp>
-        <p:nvSpPr>
-          <p:cNvPr id="3" name="Content Placeholder 2"/>
-          <p:cNvSpPr>
-            <a:spLocks noGrp="1"/>
-          </p:cNvSpPr>
-          <p:nvPr>
-            <p:ph idx="1"/>
-          </p:nvPr>
-        </p:nvSpPr>
-        <p:spPr/>
-        <p:txBody>
-          <a:bodyPr/>
-          <a:lstStyle/>
-          <a:p>
-            <a:r>
-              <a:rPr lang="en-IN" dirty="0" smtClean="0"/>
-              <a:t>Start with Eclipse.. </a:t>
-            </a:r>
-          </a:p>
-          <a:p>
-            <a:r>
-              <a:rPr lang="en-IN" dirty="0" smtClean="0"/>
-              <a:t>Need to migrate to </a:t>
-            </a:r>
-            <a:r>
-              <a:rPr lang="en-IN" dirty="0" err="1" smtClean="0"/>
-              <a:t>IntelliJ</a:t>
-            </a:r>
-            <a:r>
-              <a:rPr lang="en-IN" dirty="0" smtClean="0"/>
-              <a:t> IDE later.</a:t>
-            </a:r>
-            <a:endParaRPr lang="en-IN" dirty="0"/>
-          </a:p>
-        </p:txBody>
-      </p:sp>
-    </p:spTree>
-  </p:cSld>
-  <p:clrMapOvr>
-    <a:masterClrMapping/>
-  </p:clrMapOvr>
-</p:sld>
-</file>
-
 <file path=ppt/slides/slide2.xml><?xml version="1.0" encoding="utf-8"?>
 <p:sld xmlns:a="http://schemas.openxmlformats.org/drawingml/2006/main" xmlns:r="http://schemas.openxmlformats.org/officeDocument/2006/relationships" xmlns:p="http://schemas.openxmlformats.org/presentationml/2006/main">
   <p:cSld>
@@ -3841,6 +3380,7 @@
               <a:rPr lang="en-IN" dirty="0" smtClean="0"/>
               <a:t>Maven – to create build process .</a:t>
             </a:r>
+            <a:endParaRPr lang="en-IN" dirty="0" smtClean="0"/>
           </a:p>
           <a:p>
             <a:r>
@@ -4539,39 +4079,9 @@
           <a:lstStyle/>
           <a:p>
             <a:r>
-              <a:rPr lang="en-IN" strike="sngStrike" dirty="0" smtClean="0"/>
-              <a:t>Need to test the JDBC based functionality with this database </a:t>
-            </a:r>
-            <a:r>
               <a:rPr lang="en-IN" dirty="0" smtClean="0"/>
-              <a:t>.. </a:t>
-            </a:r>
-            <a:endParaRPr lang="en-IN" dirty="0" smtClean="0"/>
-          </a:p>
-          <a:p>
-            <a:r>
-              <a:rPr lang="en-IN" dirty="0" smtClean="0"/>
-              <a:t>Need to check if Hibernate supports </a:t>
-            </a:r>
-            <a:r>
-              <a:rPr lang="en-IN" dirty="0" err="1" smtClean="0"/>
-              <a:t>SQLite</a:t>
-            </a:r>
-            <a:r>
-              <a:rPr lang="en-IN" dirty="0" smtClean="0"/>
-              <a:t>.</a:t>
-            </a:r>
-          </a:p>
-          <a:p>
-            <a:endParaRPr lang="en-IN" dirty="0" smtClean="0"/>
-          </a:p>
-          <a:p>
-            <a:endParaRPr lang="en-IN" dirty="0" smtClean="0"/>
-          </a:p>
-          <a:p>
-            <a:endParaRPr lang="en-IN" dirty="0" smtClean="0"/>
-          </a:p>
-          <a:p>
+              <a:t>Need to test the JDBC based functionality with this database .. </a:t>
+            </a:r>
             <a:endParaRPr lang="en-IN" dirty="0"/>
           </a:p>
         </p:txBody>

</xml_diff>

<commit_message>
Latest updates based on todays meeting at office.
</commit_message>
<xml_diff>
--- a/TODO_Management_System.pptx
+++ b/TODO_Management_System.pptx
@@ -14,6 +14,10 @@
     <p:sldId id="264" r:id="rId8"/>
     <p:sldId id="263" r:id="rId9"/>
     <p:sldId id="265" r:id="rId10"/>
+    <p:sldId id="266" r:id="rId11"/>
+    <p:sldId id="267" r:id="rId12"/>
+    <p:sldId id="268" r:id="rId13"/>
+    <p:sldId id="269" r:id="rId14"/>
   </p:sldIdLst>
   <p:sldSz cx="9144000" cy="6858000" type="screen4x3"/>
   <p:notesSz cx="6858000" cy="9144000"/>
@@ -296,7 +300,8 @@
           <a:p>
             <a:fld id="{9AA4BBD5-4AE7-4597-9DFA-BCF0A279A9D6}" type="datetimeFigureOut">
               <a:rPr lang="en-US" smtClean="0"/>
-              <a:t>6/17/2015</a:t>
+              <a:pPr/>
+              <a:t>6/20/2015</a:t>
             </a:fld>
             <a:endParaRPr lang="en-IN"/>
           </a:p>
@@ -338,6 +343,7 @@
           <a:p>
             <a:fld id="{6B059D28-2F4C-46CD-BCC9-4E95240E3204}" type="slidenum">
               <a:rPr lang="en-IN" smtClean="0"/>
+              <a:pPr/>
               <a:t>‹#›</a:t>
             </a:fld>
             <a:endParaRPr lang="en-IN"/>
@@ -461,7 +467,8 @@
           <a:p>
             <a:fld id="{9AA4BBD5-4AE7-4597-9DFA-BCF0A279A9D6}" type="datetimeFigureOut">
               <a:rPr lang="en-US" smtClean="0"/>
-              <a:t>6/17/2015</a:t>
+              <a:pPr/>
+              <a:t>6/20/2015</a:t>
             </a:fld>
             <a:endParaRPr lang="en-IN"/>
           </a:p>
@@ -503,6 +510,7 @@
           <a:p>
             <a:fld id="{6B059D28-2F4C-46CD-BCC9-4E95240E3204}" type="slidenum">
               <a:rPr lang="en-IN" smtClean="0"/>
+              <a:pPr/>
               <a:t>‹#›</a:t>
             </a:fld>
             <a:endParaRPr lang="en-IN"/>
@@ -636,7 +644,8 @@
           <a:p>
             <a:fld id="{9AA4BBD5-4AE7-4597-9DFA-BCF0A279A9D6}" type="datetimeFigureOut">
               <a:rPr lang="en-US" smtClean="0"/>
-              <a:t>6/17/2015</a:t>
+              <a:pPr/>
+              <a:t>6/20/2015</a:t>
             </a:fld>
             <a:endParaRPr lang="en-IN"/>
           </a:p>
@@ -678,6 +687,7 @@
           <a:p>
             <a:fld id="{6B059D28-2F4C-46CD-BCC9-4E95240E3204}" type="slidenum">
               <a:rPr lang="en-IN" smtClean="0"/>
+              <a:pPr/>
               <a:t>‹#›</a:t>
             </a:fld>
             <a:endParaRPr lang="en-IN"/>
@@ -801,7 +811,8 @@
           <a:p>
             <a:fld id="{9AA4BBD5-4AE7-4597-9DFA-BCF0A279A9D6}" type="datetimeFigureOut">
               <a:rPr lang="en-US" smtClean="0"/>
-              <a:t>6/17/2015</a:t>
+              <a:pPr/>
+              <a:t>6/20/2015</a:t>
             </a:fld>
             <a:endParaRPr lang="en-IN"/>
           </a:p>
@@ -843,6 +854,7 @@
           <a:p>
             <a:fld id="{6B059D28-2F4C-46CD-BCC9-4E95240E3204}" type="slidenum">
               <a:rPr lang="en-IN" smtClean="0"/>
+              <a:pPr/>
               <a:t>‹#›</a:t>
             </a:fld>
             <a:endParaRPr lang="en-IN"/>
@@ -1042,7 +1054,8 @@
           <a:p>
             <a:fld id="{9AA4BBD5-4AE7-4597-9DFA-BCF0A279A9D6}" type="datetimeFigureOut">
               <a:rPr lang="en-US" smtClean="0"/>
-              <a:t>6/17/2015</a:t>
+              <a:pPr/>
+              <a:t>6/20/2015</a:t>
             </a:fld>
             <a:endParaRPr lang="en-IN"/>
           </a:p>
@@ -1084,6 +1097,7 @@
           <a:p>
             <a:fld id="{6B059D28-2F4C-46CD-BCC9-4E95240E3204}" type="slidenum">
               <a:rPr lang="en-IN" smtClean="0"/>
+              <a:pPr/>
               <a:t>‹#›</a:t>
             </a:fld>
             <a:endParaRPr lang="en-IN"/>
@@ -1325,7 +1339,8 @@
           <a:p>
             <a:fld id="{9AA4BBD5-4AE7-4597-9DFA-BCF0A279A9D6}" type="datetimeFigureOut">
               <a:rPr lang="en-US" smtClean="0"/>
-              <a:t>6/17/2015</a:t>
+              <a:pPr/>
+              <a:t>6/20/2015</a:t>
             </a:fld>
             <a:endParaRPr lang="en-IN"/>
           </a:p>
@@ -1367,6 +1382,7 @@
           <a:p>
             <a:fld id="{6B059D28-2F4C-46CD-BCC9-4E95240E3204}" type="slidenum">
               <a:rPr lang="en-IN" smtClean="0"/>
+              <a:pPr/>
               <a:t>‹#›</a:t>
             </a:fld>
             <a:endParaRPr lang="en-IN"/>
@@ -1742,7 +1758,8 @@
           <a:p>
             <a:fld id="{9AA4BBD5-4AE7-4597-9DFA-BCF0A279A9D6}" type="datetimeFigureOut">
               <a:rPr lang="en-US" smtClean="0"/>
-              <a:t>6/17/2015</a:t>
+              <a:pPr/>
+              <a:t>6/20/2015</a:t>
             </a:fld>
             <a:endParaRPr lang="en-IN"/>
           </a:p>
@@ -1784,6 +1801,7 @@
           <a:p>
             <a:fld id="{6B059D28-2F4C-46CD-BCC9-4E95240E3204}" type="slidenum">
               <a:rPr lang="en-IN" smtClean="0"/>
+              <a:pPr/>
               <a:t>‹#›</a:t>
             </a:fld>
             <a:endParaRPr lang="en-IN"/>
@@ -1855,7 +1873,8 @@
           <a:p>
             <a:fld id="{9AA4BBD5-4AE7-4597-9DFA-BCF0A279A9D6}" type="datetimeFigureOut">
               <a:rPr lang="en-US" smtClean="0"/>
-              <a:t>6/17/2015</a:t>
+              <a:pPr/>
+              <a:t>6/20/2015</a:t>
             </a:fld>
             <a:endParaRPr lang="en-IN"/>
           </a:p>
@@ -1897,6 +1916,7 @@
           <a:p>
             <a:fld id="{6B059D28-2F4C-46CD-BCC9-4E95240E3204}" type="slidenum">
               <a:rPr lang="en-IN" smtClean="0"/>
+              <a:pPr/>
               <a:t>‹#›</a:t>
             </a:fld>
             <a:endParaRPr lang="en-IN"/>
@@ -1945,7 +1965,8 @@
           <a:p>
             <a:fld id="{9AA4BBD5-4AE7-4597-9DFA-BCF0A279A9D6}" type="datetimeFigureOut">
               <a:rPr lang="en-US" smtClean="0"/>
-              <a:t>6/17/2015</a:t>
+              <a:pPr/>
+              <a:t>6/20/2015</a:t>
             </a:fld>
             <a:endParaRPr lang="en-IN"/>
           </a:p>
@@ -1987,6 +2008,7 @@
           <a:p>
             <a:fld id="{6B059D28-2F4C-46CD-BCC9-4E95240E3204}" type="slidenum">
               <a:rPr lang="en-IN" smtClean="0"/>
+              <a:pPr/>
               <a:t>‹#›</a:t>
             </a:fld>
             <a:endParaRPr lang="en-IN"/>
@@ -2217,7 +2239,8 @@
           <a:p>
             <a:fld id="{9AA4BBD5-4AE7-4597-9DFA-BCF0A279A9D6}" type="datetimeFigureOut">
               <a:rPr lang="en-US" smtClean="0"/>
-              <a:t>6/17/2015</a:t>
+              <a:pPr/>
+              <a:t>6/20/2015</a:t>
             </a:fld>
             <a:endParaRPr lang="en-IN"/>
           </a:p>
@@ -2259,6 +2282,7 @@
           <a:p>
             <a:fld id="{6B059D28-2F4C-46CD-BCC9-4E95240E3204}" type="slidenum">
               <a:rPr lang="en-IN" smtClean="0"/>
+              <a:pPr/>
               <a:t>‹#›</a:t>
             </a:fld>
             <a:endParaRPr lang="en-IN"/>
@@ -2465,7 +2489,8 @@
           <a:p>
             <a:fld id="{9AA4BBD5-4AE7-4597-9DFA-BCF0A279A9D6}" type="datetimeFigureOut">
               <a:rPr lang="en-US" smtClean="0"/>
-              <a:t>6/17/2015</a:t>
+              <a:pPr/>
+              <a:t>6/20/2015</a:t>
             </a:fld>
             <a:endParaRPr lang="en-IN"/>
           </a:p>
@@ -2507,6 +2532,7 @@
           <a:p>
             <a:fld id="{6B059D28-2F4C-46CD-BCC9-4E95240E3204}" type="slidenum">
               <a:rPr lang="en-IN" smtClean="0"/>
+              <a:pPr/>
               <a:t>‹#›</a:t>
             </a:fld>
             <a:endParaRPr lang="en-IN"/>
@@ -2673,7 +2699,8 @@
           <a:p>
             <a:fld id="{9AA4BBD5-4AE7-4597-9DFA-BCF0A279A9D6}" type="datetimeFigureOut">
               <a:rPr lang="en-US" smtClean="0"/>
-              <a:t>6/17/2015</a:t>
+              <a:pPr/>
+              <a:t>6/20/2015</a:t>
             </a:fld>
             <a:endParaRPr lang="en-IN"/>
           </a:p>
@@ -2751,6 +2778,7 @@
           <a:p>
             <a:fld id="{6B059D28-2F4C-46CD-BCC9-4E95240E3204}" type="slidenum">
               <a:rPr lang="en-IN" smtClean="0"/>
+              <a:pPr/>
               <a:t>‹#›</a:t>
             </a:fld>
             <a:endParaRPr lang="en-IN"/>
@@ -3107,6 +3135,439 @@
 </p:sld>
 </file>
 
+<file path=ppt/slides/slide10.xml><?xml version="1.0" encoding="utf-8"?>
+<p:sld xmlns:a="http://schemas.openxmlformats.org/drawingml/2006/main" xmlns:r="http://schemas.openxmlformats.org/officeDocument/2006/relationships" xmlns:p="http://schemas.openxmlformats.org/presentationml/2006/main">
+  <p:cSld>
+    <p:spTree>
+      <p:nvGrpSpPr>
+        <p:cNvPr id="1" name=""/>
+        <p:cNvGrpSpPr/>
+        <p:nvPr/>
+      </p:nvGrpSpPr>
+      <p:grpSpPr>
+        <a:xfrm>
+          <a:off x="0" y="0"/>
+          <a:ext cx="0" cy="0"/>
+          <a:chOff x="0" y="0"/>
+          <a:chExt cx="0" cy="0"/>
+        </a:xfrm>
+      </p:grpSpPr>
+      <p:sp>
+        <p:nvSpPr>
+          <p:cNvPr id="2" name="Title 1"/>
+          <p:cNvSpPr>
+            <a:spLocks noGrp="1"/>
+          </p:cNvSpPr>
+          <p:nvPr>
+            <p:ph type="title"/>
+          </p:nvPr>
+        </p:nvSpPr>
+        <p:spPr/>
+        <p:txBody>
+          <a:bodyPr/>
+          <a:lstStyle/>
+          <a:p>
+            <a:r>
+              <a:rPr lang="en-IN" dirty="0" smtClean="0"/>
+              <a:t>Steps forward -22Jun2015</a:t>
+            </a:r>
+            <a:endParaRPr lang="en-IN" dirty="0"/>
+          </a:p>
+        </p:txBody>
+      </p:sp>
+      <p:sp>
+        <p:nvSpPr>
+          <p:cNvPr id="3" name="Content Placeholder 2"/>
+          <p:cNvSpPr>
+            <a:spLocks noGrp="1"/>
+          </p:cNvSpPr>
+          <p:nvPr>
+            <p:ph idx="1"/>
+          </p:nvPr>
+        </p:nvSpPr>
+        <p:spPr/>
+        <p:txBody>
+          <a:bodyPr>
+            <a:normAutofit fontScale="77500" lnSpcReduction="20000"/>
+          </a:bodyPr>
+          <a:lstStyle/>
+          <a:p>
+            <a:r>
+              <a:rPr lang="en-IN" dirty="0" smtClean="0"/>
+              <a:t>First complete the coding for the </a:t>
+            </a:r>
+            <a:r>
+              <a:rPr lang="en-IN" dirty="0" err="1" smtClean="0"/>
+              <a:t>TODOManager</a:t>
+            </a:r>
+            <a:r>
+              <a:rPr lang="en-IN" dirty="0" smtClean="0"/>
+              <a:t> class and the Services layer and the Domain layer .</a:t>
+            </a:r>
+          </a:p>
+          <a:p>
+            <a:r>
+              <a:rPr lang="en-IN" dirty="0" smtClean="0"/>
+              <a:t>Follow the TDD approach and test these three layers code .</a:t>
+            </a:r>
+          </a:p>
+          <a:p>
+            <a:r>
+              <a:rPr lang="en-IN" dirty="0" smtClean="0"/>
+              <a:t>Use stubs for mimicking the database which can be abstracted using a simple interface and later use a Hibernate based implementation for the integration of the DAO layer with the Front end code .</a:t>
+            </a:r>
+          </a:p>
+          <a:p>
+            <a:r>
+              <a:rPr lang="en-IN" dirty="0" smtClean="0"/>
+              <a:t>Need to test the usage of the </a:t>
+            </a:r>
+            <a:r>
+              <a:rPr lang="en-IN" dirty="0" err="1" smtClean="0"/>
+              <a:t>TravisCI</a:t>
+            </a:r>
+            <a:r>
+              <a:rPr lang="en-IN" dirty="0" smtClean="0"/>
+              <a:t> with the ant scripts </a:t>
+            </a:r>
+            <a:r>
+              <a:rPr lang="en-IN" dirty="0" smtClean="0"/>
+              <a:t>as an interim approach. This needs to be later replaced with maven scripts later or vice versa .</a:t>
+            </a:r>
+          </a:p>
+          <a:p>
+            <a:r>
+              <a:rPr lang="en-IN" dirty="0" smtClean="0"/>
+              <a:t>The DAO layer includes the usage of Hibernate and the Database (</a:t>
+            </a:r>
+            <a:r>
+              <a:rPr lang="en-IN" dirty="0" err="1" smtClean="0"/>
+              <a:t>SQLite</a:t>
+            </a:r>
+            <a:r>
+              <a:rPr lang="en-IN" dirty="0" smtClean="0"/>
+              <a:t> at this point , might have to switch to </a:t>
+            </a:r>
+            <a:r>
+              <a:rPr lang="en-IN" dirty="0" err="1" smtClean="0"/>
+              <a:t>MySQL</a:t>
+            </a:r>
+            <a:r>
+              <a:rPr lang="en-IN" dirty="0" smtClean="0"/>
+              <a:t> or </a:t>
+            </a:r>
+            <a:r>
+              <a:rPr lang="en-IN" dirty="0" err="1" smtClean="0"/>
+              <a:t>PostGres</a:t>
+            </a:r>
+            <a:r>
+              <a:rPr lang="en-IN" dirty="0" smtClean="0"/>
+              <a:t> in case Hibernate does not support it .)</a:t>
+            </a:r>
+          </a:p>
+          <a:p>
+            <a:endParaRPr lang="en-IN" dirty="0" smtClean="0"/>
+          </a:p>
+          <a:p>
+            <a:endParaRPr lang="en-IN" dirty="0"/>
+          </a:p>
+        </p:txBody>
+      </p:sp>
+    </p:spTree>
+  </p:cSld>
+  <p:clrMapOvr>
+    <a:masterClrMapping/>
+  </p:clrMapOvr>
+</p:sld>
+</file>
+
+<file path=ppt/slides/slide11.xml><?xml version="1.0" encoding="utf-8"?>
+<p:sld xmlns:a="http://schemas.openxmlformats.org/drawingml/2006/main" xmlns:r="http://schemas.openxmlformats.org/officeDocument/2006/relationships" xmlns:p="http://schemas.openxmlformats.org/presentationml/2006/main">
+  <p:cSld>
+    <p:spTree>
+      <p:nvGrpSpPr>
+        <p:cNvPr id="1" name=""/>
+        <p:cNvGrpSpPr/>
+        <p:nvPr/>
+      </p:nvGrpSpPr>
+      <p:grpSpPr>
+        <a:xfrm>
+          <a:off x="0" y="0"/>
+          <a:ext cx="0" cy="0"/>
+          <a:chOff x="0" y="0"/>
+          <a:chExt cx="0" cy="0"/>
+        </a:xfrm>
+      </p:grpSpPr>
+      <p:sp>
+        <p:nvSpPr>
+          <p:cNvPr id="2" name="Title 1"/>
+          <p:cNvSpPr>
+            <a:spLocks noGrp="1"/>
+          </p:cNvSpPr>
+          <p:nvPr>
+            <p:ph type="title"/>
+          </p:nvPr>
+        </p:nvSpPr>
+        <p:spPr/>
+        <p:txBody>
+          <a:bodyPr/>
+          <a:lstStyle/>
+          <a:p>
+            <a:r>
+              <a:rPr lang="en-IN" dirty="0" smtClean="0"/>
+              <a:t>Coding – Approach , time lines</a:t>
+            </a:r>
+            <a:endParaRPr lang="en-IN" dirty="0"/>
+          </a:p>
+        </p:txBody>
+      </p:sp>
+      <p:sp>
+        <p:nvSpPr>
+          <p:cNvPr id="3" name="Content Placeholder 2"/>
+          <p:cNvSpPr>
+            <a:spLocks noGrp="1"/>
+          </p:cNvSpPr>
+          <p:nvPr>
+            <p:ph idx="1"/>
+          </p:nvPr>
+        </p:nvSpPr>
+        <p:spPr/>
+        <p:txBody>
+          <a:bodyPr>
+            <a:normAutofit fontScale="92500" lnSpcReduction="20000"/>
+          </a:bodyPr>
+          <a:lstStyle/>
+          <a:p>
+            <a:r>
+              <a:rPr lang="en-IN" dirty="0" smtClean="0"/>
+              <a:t>As we are looking at a multi tiered , layered implementation, we would need to define the contracts between each of the layers using interfaces.</a:t>
+            </a:r>
+          </a:p>
+          <a:p>
+            <a:r>
+              <a:rPr lang="en-IN" dirty="0" smtClean="0"/>
+              <a:t>Finish the code and test cases for the Manager class , Services layer and the Domain layer.</a:t>
+            </a:r>
+          </a:p>
+          <a:p>
+            <a:r>
+              <a:rPr lang="en-IN" dirty="0" smtClean="0"/>
+              <a:t>Proceed with the </a:t>
+            </a:r>
+            <a:r>
+              <a:rPr lang="en-IN" dirty="0" err="1" smtClean="0"/>
+              <a:t>TravisCI</a:t>
+            </a:r>
+            <a:r>
+              <a:rPr lang="en-IN" dirty="0" smtClean="0"/>
+              <a:t> support implementation for the automatic code build support.</a:t>
+            </a:r>
+          </a:p>
+          <a:p>
+            <a:r>
+              <a:rPr lang="en-IN" dirty="0" smtClean="0"/>
+              <a:t>Hope to do this by the end of this week  and later proceed with study on the DAO layer .</a:t>
+            </a:r>
+          </a:p>
+          <a:p>
+            <a:endParaRPr lang="en-IN" dirty="0"/>
+          </a:p>
+        </p:txBody>
+      </p:sp>
+    </p:spTree>
+  </p:cSld>
+  <p:clrMapOvr>
+    <a:masterClrMapping/>
+  </p:clrMapOvr>
+</p:sld>
+</file>
+
+<file path=ppt/slides/slide12.xml><?xml version="1.0" encoding="utf-8"?>
+<p:sld xmlns:a="http://schemas.openxmlformats.org/drawingml/2006/main" xmlns:r="http://schemas.openxmlformats.org/officeDocument/2006/relationships" xmlns:p="http://schemas.openxmlformats.org/presentationml/2006/main">
+  <p:cSld>
+    <p:spTree>
+      <p:nvGrpSpPr>
+        <p:cNvPr id="1" name=""/>
+        <p:cNvGrpSpPr/>
+        <p:nvPr/>
+      </p:nvGrpSpPr>
+      <p:grpSpPr>
+        <a:xfrm>
+          <a:off x="0" y="0"/>
+          <a:ext cx="0" cy="0"/>
+          <a:chOff x="0" y="0"/>
+          <a:chExt cx="0" cy="0"/>
+        </a:xfrm>
+      </p:grpSpPr>
+      <p:sp>
+        <p:nvSpPr>
+          <p:cNvPr id="2" name="Title 1"/>
+          <p:cNvSpPr>
+            <a:spLocks noGrp="1"/>
+          </p:cNvSpPr>
+          <p:nvPr>
+            <p:ph type="title"/>
+          </p:nvPr>
+        </p:nvSpPr>
+        <p:spPr/>
+        <p:txBody>
+          <a:bodyPr/>
+          <a:lstStyle/>
+          <a:p>
+            <a:r>
+              <a:rPr lang="en-IN" dirty="0" smtClean="0"/>
+              <a:t>Coding - DAO</a:t>
+            </a:r>
+            <a:endParaRPr lang="en-IN" dirty="0"/>
+          </a:p>
+        </p:txBody>
+      </p:sp>
+      <p:sp>
+        <p:nvSpPr>
+          <p:cNvPr id="3" name="Content Placeholder 2"/>
+          <p:cNvSpPr>
+            <a:spLocks noGrp="1"/>
+          </p:cNvSpPr>
+          <p:nvPr>
+            <p:ph idx="1"/>
+          </p:nvPr>
+        </p:nvSpPr>
+        <p:spPr/>
+        <p:txBody>
+          <a:bodyPr/>
+          <a:lstStyle/>
+          <a:p>
+            <a:r>
+              <a:rPr lang="en-IN" dirty="0" smtClean="0"/>
+              <a:t>Starting next week start the set up and coding of the DAO layer .(Hibernate tutorials)</a:t>
+            </a:r>
+          </a:p>
+          <a:p>
+            <a:r>
+              <a:rPr lang="en-IN" dirty="0" smtClean="0"/>
+              <a:t>As we have to follow TDD .. Understand about the </a:t>
+            </a:r>
+            <a:r>
+              <a:rPr lang="en-IN" dirty="0" err="1" smtClean="0"/>
+              <a:t>DBUnit</a:t>
+            </a:r>
+            <a:r>
+              <a:rPr lang="en-IN" dirty="0" smtClean="0"/>
+              <a:t> , </a:t>
+            </a:r>
+            <a:r>
+              <a:rPr lang="en-IN" dirty="0" err="1" smtClean="0"/>
+              <a:t>Mockito</a:t>
+            </a:r>
+            <a:r>
+              <a:rPr lang="en-IN" dirty="0" smtClean="0"/>
+              <a:t> and how to set up </a:t>
+            </a:r>
+            <a:r>
+              <a:rPr lang="en-IN" dirty="0" err="1" smtClean="0"/>
+              <a:t>DBScripts</a:t>
+            </a:r>
+            <a:r>
+              <a:rPr lang="en-IN" dirty="0" smtClean="0"/>
+              <a:t> for the test harnesses that we might need to create.</a:t>
+            </a:r>
+            <a:endParaRPr lang="en-IN" dirty="0"/>
+          </a:p>
+        </p:txBody>
+      </p:sp>
+    </p:spTree>
+  </p:cSld>
+  <p:clrMapOvr>
+    <a:masterClrMapping/>
+  </p:clrMapOvr>
+</p:sld>
+</file>
+
+<file path=ppt/slides/slide13.xml><?xml version="1.0" encoding="utf-8"?>
+<p:sld xmlns:a="http://schemas.openxmlformats.org/drawingml/2006/main" xmlns:r="http://schemas.openxmlformats.org/officeDocument/2006/relationships" xmlns:p="http://schemas.openxmlformats.org/presentationml/2006/main">
+  <p:cSld>
+    <p:spTree>
+      <p:nvGrpSpPr>
+        <p:cNvPr id="1" name=""/>
+        <p:cNvGrpSpPr/>
+        <p:nvPr/>
+      </p:nvGrpSpPr>
+      <p:grpSpPr>
+        <a:xfrm>
+          <a:off x="0" y="0"/>
+          <a:ext cx="0" cy="0"/>
+          <a:chOff x="0" y="0"/>
+          <a:chExt cx="0" cy="0"/>
+        </a:xfrm>
+      </p:grpSpPr>
+      <p:sp>
+        <p:nvSpPr>
+          <p:cNvPr id="2" name="Title 1"/>
+          <p:cNvSpPr>
+            <a:spLocks noGrp="1"/>
+          </p:cNvSpPr>
+          <p:nvPr>
+            <p:ph type="title"/>
+          </p:nvPr>
+        </p:nvSpPr>
+        <p:spPr/>
+        <p:txBody>
+          <a:bodyPr/>
+          <a:lstStyle/>
+          <a:p>
+            <a:r>
+              <a:rPr lang="en-IN" dirty="0" smtClean="0"/>
+              <a:t>Development Environment</a:t>
+            </a:r>
+            <a:endParaRPr lang="en-IN" dirty="0"/>
+          </a:p>
+        </p:txBody>
+      </p:sp>
+      <p:sp>
+        <p:nvSpPr>
+          <p:cNvPr id="3" name="Content Placeholder 2"/>
+          <p:cNvSpPr>
+            <a:spLocks noGrp="1"/>
+          </p:cNvSpPr>
+          <p:nvPr>
+            <p:ph idx="1"/>
+          </p:nvPr>
+        </p:nvSpPr>
+        <p:spPr/>
+        <p:txBody>
+          <a:bodyPr/>
+          <a:lstStyle/>
+          <a:p>
+            <a:r>
+              <a:rPr lang="en-IN" dirty="0" smtClean="0"/>
+              <a:t>Start with Eclipse.. </a:t>
+            </a:r>
+          </a:p>
+          <a:p>
+            <a:r>
+              <a:rPr lang="en-IN" dirty="0" smtClean="0"/>
+              <a:t>Need to migrate to </a:t>
+            </a:r>
+            <a:r>
+              <a:rPr lang="en-IN" dirty="0" err="1" smtClean="0"/>
+              <a:t>IntelliJ</a:t>
+            </a:r>
+            <a:r>
+              <a:rPr lang="en-IN" dirty="0" smtClean="0"/>
+              <a:t> IDE later.</a:t>
+            </a:r>
+            <a:endParaRPr lang="en-IN" dirty="0"/>
+          </a:p>
+        </p:txBody>
+      </p:sp>
+    </p:spTree>
+  </p:cSld>
+  <p:clrMapOvr>
+    <a:masterClrMapping/>
+  </p:clrMapOvr>
+</p:sld>
+</file>
+
 <file path=ppt/slides/slide2.xml><?xml version="1.0" encoding="utf-8"?>
 <p:sld xmlns:a="http://schemas.openxmlformats.org/drawingml/2006/main" xmlns:r="http://schemas.openxmlformats.org/officeDocument/2006/relationships" xmlns:p="http://schemas.openxmlformats.org/presentationml/2006/main">
   <p:cSld>
@@ -3380,7 +3841,6 @@
               <a:rPr lang="en-IN" dirty="0" smtClean="0"/>
               <a:t>Maven – to create build process .</a:t>
             </a:r>
-            <a:endParaRPr lang="en-IN" dirty="0" smtClean="0"/>
           </a:p>
           <a:p>
             <a:r>
@@ -4079,9 +4539,39 @@
           <a:lstStyle/>
           <a:p>
             <a:r>
-              <a:rPr lang="en-IN" dirty="0" smtClean="0"/>
-              <a:t>Need to test the JDBC based functionality with this database .. </a:t>
-            </a:r>
+              <a:rPr lang="en-IN" strike="sngStrike" dirty="0" smtClean="0"/>
+              <a:t>Need to test the JDBC based functionality with this database </a:t>
+            </a:r>
+            <a:r>
+              <a:rPr lang="en-IN" dirty="0" smtClean="0"/>
+              <a:t>.. </a:t>
+            </a:r>
+            <a:endParaRPr lang="en-IN" dirty="0" smtClean="0"/>
+          </a:p>
+          <a:p>
+            <a:r>
+              <a:rPr lang="en-IN" dirty="0" smtClean="0"/>
+              <a:t>Need to check if Hibernate supports </a:t>
+            </a:r>
+            <a:r>
+              <a:rPr lang="en-IN" dirty="0" err="1" smtClean="0"/>
+              <a:t>SQLite</a:t>
+            </a:r>
+            <a:r>
+              <a:rPr lang="en-IN" dirty="0" smtClean="0"/>
+              <a:t>.</a:t>
+            </a:r>
+          </a:p>
+          <a:p>
+            <a:endParaRPr lang="en-IN" dirty="0" smtClean="0"/>
+          </a:p>
+          <a:p>
+            <a:endParaRPr lang="en-IN" dirty="0" smtClean="0"/>
+          </a:p>
+          <a:p>
+            <a:endParaRPr lang="en-IN" dirty="0" smtClean="0"/>
+          </a:p>
+          <a:p>
             <a:endParaRPr lang="en-IN" dirty="0"/>
           </a:p>
         </p:txBody>

</xml_diff>